<commit_message>
- Removed unused out of date research projects folder
Signed-off-by: Burnside <jonathan.burnside@gmail.com>
</commit_message>
<xml_diff>
--- a/Lecture Slides/Basics of Machine Learning.pptx
+++ b/Lecture Slides/Basics of Machine Learning.pptx
@@ -109,6 +109,11 @@
       </a:defRPr>
     </a:lvl9pPr>
   </p:defaultTextStyle>
+  <p:extLst>
+    <p:ext uri="{EFAFB233-063F-42B5-8137-9DF3F51BA10A}">
+      <p15:sldGuideLst xmlns:p15="http://schemas.microsoft.com/office/powerpoint/2012/main"/>
+    </p:ext>
+  </p:extLst>
 </p:presentation>
 </file>
 
@@ -298,7 +303,7 @@
           <a:p>
             <a:fld id="{883CD2A6-7895-48F9-BCB3-1493861FCC05}" type="datetimeFigureOut">
               <a:rPr lang="en-US" smtClean="0"/>
-              <a:t>9/9/2016</a:t>
+              <a:t>1/17/2017</a:t>
             </a:fld>
             <a:endParaRPr lang="en-US"/>
           </a:p>
@@ -573,7 +578,7 @@
           <a:p>
             <a:fld id="{883CD2A6-7895-48F9-BCB3-1493861FCC05}" type="datetimeFigureOut">
               <a:rPr lang="en-US" smtClean="0"/>
-              <a:t>9/9/2016</a:t>
+              <a:t>1/17/2017</a:t>
             </a:fld>
             <a:endParaRPr lang="en-US"/>
           </a:p>
@@ -767,7 +772,7 @@
           <a:p>
             <a:fld id="{883CD2A6-7895-48F9-BCB3-1493861FCC05}" type="datetimeFigureOut">
               <a:rPr lang="en-US" smtClean="0"/>
-              <a:t>9/9/2016</a:t>
+              <a:t>1/17/2017</a:t>
             </a:fld>
             <a:endParaRPr lang="en-US"/>
           </a:p>
@@ -1040,7 +1045,7 @@
           <a:p>
             <a:fld id="{883CD2A6-7895-48F9-BCB3-1493861FCC05}" type="datetimeFigureOut">
               <a:rPr lang="en-US" smtClean="0"/>
-              <a:t>9/9/2016</a:t>
+              <a:t>1/17/2017</a:t>
             </a:fld>
             <a:endParaRPr lang="en-US"/>
           </a:p>
@@ -1381,7 +1386,7 @@
           <a:p>
             <a:fld id="{883CD2A6-7895-48F9-BCB3-1493861FCC05}" type="datetimeFigureOut">
               <a:rPr lang="en-US" smtClean="0"/>
-              <a:t>9/9/2016</a:t>
+              <a:t>1/17/2017</a:t>
             </a:fld>
             <a:endParaRPr lang="en-US"/>
           </a:p>
@@ -2004,7 +2009,7 @@
           <a:p>
             <a:fld id="{883CD2A6-7895-48F9-BCB3-1493861FCC05}" type="datetimeFigureOut">
               <a:rPr lang="en-US" smtClean="0"/>
-              <a:t>9/9/2016</a:t>
+              <a:t>1/17/2017</a:t>
             </a:fld>
             <a:endParaRPr lang="en-US"/>
           </a:p>
@@ -2864,7 +2869,7 @@
           <a:p>
             <a:fld id="{883CD2A6-7895-48F9-BCB3-1493861FCC05}" type="datetimeFigureOut">
               <a:rPr lang="en-US" smtClean="0"/>
-              <a:t>9/9/2016</a:t>
+              <a:t>1/17/2017</a:t>
             </a:fld>
             <a:endParaRPr lang="en-US"/>
           </a:p>
@@ -3034,7 +3039,7 @@
           <a:p>
             <a:fld id="{883CD2A6-7895-48F9-BCB3-1493861FCC05}" type="datetimeFigureOut">
               <a:rPr lang="en-US" smtClean="0"/>
-              <a:t>9/9/2016</a:t>
+              <a:t>1/17/2017</a:t>
             </a:fld>
             <a:endParaRPr lang="en-US"/>
           </a:p>
@@ -3214,7 +3219,7 @@
           <a:p>
             <a:fld id="{883CD2A6-7895-48F9-BCB3-1493861FCC05}" type="datetimeFigureOut">
               <a:rPr lang="en-US" smtClean="0"/>
-              <a:t>9/9/2016</a:t>
+              <a:t>1/17/2017</a:t>
             </a:fld>
             <a:endParaRPr lang="en-US"/>
           </a:p>
@@ -3384,7 +3389,7 @@
           <a:p>
             <a:fld id="{883CD2A6-7895-48F9-BCB3-1493861FCC05}" type="datetimeFigureOut">
               <a:rPr lang="en-US" smtClean="0"/>
-              <a:t>9/9/2016</a:t>
+              <a:t>1/17/2017</a:t>
             </a:fld>
             <a:endParaRPr lang="en-US"/>
           </a:p>
@@ -3631,7 +3636,7 @@
           <a:p>
             <a:fld id="{883CD2A6-7895-48F9-BCB3-1493861FCC05}" type="datetimeFigureOut">
               <a:rPr lang="en-US" smtClean="0"/>
-              <a:t>9/9/2016</a:t>
+              <a:t>1/17/2017</a:t>
             </a:fld>
             <a:endParaRPr lang="en-US"/>
           </a:p>
@@ -3923,7 +3928,7 @@
           <a:p>
             <a:fld id="{883CD2A6-7895-48F9-BCB3-1493861FCC05}" type="datetimeFigureOut">
               <a:rPr lang="en-US" smtClean="0"/>
-              <a:t>9/9/2016</a:t>
+              <a:t>1/17/2017</a:t>
             </a:fld>
             <a:endParaRPr lang="en-US"/>
           </a:p>
@@ -4367,7 +4372,7 @@
           <a:p>
             <a:fld id="{883CD2A6-7895-48F9-BCB3-1493861FCC05}" type="datetimeFigureOut">
               <a:rPr lang="en-US" smtClean="0"/>
-              <a:t>9/9/2016</a:t>
+              <a:t>1/17/2017</a:t>
             </a:fld>
             <a:endParaRPr lang="en-US"/>
           </a:p>
@@ -4485,7 +4490,7 @@
           <a:p>
             <a:fld id="{883CD2A6-7895-48F9-BCB3-1493861FCC05}" type="datetimeFigureOut">
               <a:rPr lang="en-US" smtClean="0"/>
-              <a:t>9/9/2016</a:t>
+              <a:t>1/17/2017</a:t>
             </a:fld>
             <a:endParaRPr lang="en-US"/>
           </a:p>
@@ -4580,7 +4585,7 @@
           <a:p>
             <a:fld id="{883CD2A6-7895-48F9-BCB3-1493861FCC05}" type="datetimeFigureOut">
               <a:rPr lang="en-US" smtClean="0"/>
-              <a:t>9/9/2016</a:t>
+              <a:t>1/17/2017</a:t>
             </a:fld>
             <a:endParaRPr lang="en-US"/>
           </a:p>
@@ -4859,7 +4864,7 @@
           <a:p>
             <a:fld id="{883CD2A6-7895-48F9-BCB3-1493861FCC05}" type="datetimeFigureOut">
               <a:rPr lang="en-US" smtClean="0"/>
-              <a:t>9/9/2016</a:t>
+              <a:t>1/17/2017</a:t>
             </a:fld>
             <a:endParaRPr lang="en-US"/>
           </a:p>
@@ -5134,7 +5139,7 @@
           <a:p>
             <a:fld id="{883CD2A6-7895-48F9-BCB3-1493861FCC05}" type="datetimeFigureOut">
               <a:rPr lang="en-US" smtClean="0"/>
-              <a:t>9/9/2016</a:t>
+              <a:t>1/17/2017</a:t>
             </a:fld>
             <a:endParaRPr lang="en-US"/>
           </a:p>
@@ -5563,7 +5568,7 @@
           <a:p>
             <a:fld id="{883CD2A6-7895-48F9-BCB3-1493861FCC05}" type="datetimeFigureOut">
               <a:rPr lang="en-US" smtClean="0"/>
-              <a:t>9/9/2016</a:t>
+              <a:t>1/17/2017</a:t>
             </a:fld>
             <a:endParaRPr lang="en-US"/>
           </a:p>
@@ -6425,7 +6430,7 @@
           <a:p>
             <a:r>
               <a:rPr lang="en-US" dirty="0"/>
-              <a:t>Many machine Learning Algorithms will take a similar approach:</a:t>
+              <a:t>Many machine learning algorithms will take a similar approach:</a:t>
             </a:r>
           </a:p>
           <a:p>
@@ -6602,7 +6607,14 @@
             <a:pPr lvl="1"/>
             <a:r>
               <a:rPr lang="en-US" dirty="0"/>
-              <a:t>Features – size of house, number of rooms, location</a:t>
+              <a:t>Feature – [size of house, number of rooms, location] &lt;- One feature</a:t>
+            </a:r>
+          </a:p>
+          <a:p>
+            <a:pPr lvl="1"/>
+            <a:r>
+              <a:rPr lang="en-US" dirty="0"/>
+              <a:t>Features – A collection of multiple instances of the data feature</a:t>
             </a:r>
           </a:p>
           <a:p>

</xml_diff>

<commit_message>
- Added pseudo-code for linear regression methods - Cleaned up mild errors in basics and neural network materials
Signed-off-by: Burnside <jonathan.burnside@gmail.com>
</commit_message>
<xml_diff>
--- a/Lecture Slides/Basics of Machine Learning.pptx
+++ b/Lecture Slides/Basics of Machine Learning.pptx
@@ -303,7 +303,7 @@
           <a:p>
             <a:fld id="{883CD2A6-7895-48F9-BCB3-1493861FCC05}" type="datetimeFigureOut">
               <a:rPr lang="en-US" smtClean="0"/>
-              <a:t>1/17/2017</a:t>
+              <a:t>10/12/2016</a:t>
             </a:fld>
             <a:endParaRPr lang="en-US"/>
           </a:p>
@@ -578,7 +578,7 @@
           <a:p>
             <a:fld id="{883CD2A6-7895-48F9-BCB3-1493861FCC05}" type="datetimeFigureOut">
               <a:rPr lang="en-US" smtClean="0"/>
-              <a:t>1/17/2017</a:t>
+              <a:t>10/12/2016</a:t>
             </a:fld>
             <a:endParaRPr lang="en-US"/>
           </a:p>
@@ -772,7 +772,7 @@
           <a:p>
             <a:fld id="{883CD2A6-7895-48F9-BCB3-1493861FCC05}" type="datetimeFigureOut">
               <a:rPr lang="en-US" smtClean="0"/>
-              <a:t>1/17/2017</a:t>
+              <a:t>10/12/2016</a:t>
             </a:fld>
             <a:endParaRPr lang="en-US"/>
           </a:p>
@@ -1045,7 +1045,7 @@
           <a:p>
             <a:fld id="{883CD2A6-7895-48F9-BCB3-1493861FCC05}" type="datetimeFigureOut">
               <a:rPr lang="en-US" smtClean="0"/>
-              <a:t>1/17/2017</a:t>
+              <a:t>10/12/2016</a:t>
             </a:fld>
             <a:endParaRPr lang="en-US"/>
           </a:p>
@@ -1386,7 +1386,7 @@
           <a:p>
             <a:fld id="{883CD2A6-7895-48F9-BCB3-1493861FCC05}" type="datetimeFigureOut">
               <a:rPr lang="en-US" smtClean="0"/>
-              <a:t>1/17/2017</a:t>
+              <a:t>10/12/2016</a:t>
             </a:fld>
             <a:endParaRPr lang="en-US"/>
           </a:p>
@@ -2009,7 +2009,7 @@
           <a:p>
             <a:fld id="{883CD2A6-7895-48F9-BCB3-1493861FCC05}" type="datetimeFigureOut">
               <a:rPr lang="en-US" smtClean="0"/>
-              <a:t>1/17/2017</a:t>
+              <a:t>10/12/2016</a:t>
             </a:fld>
             <a:endParaRPr lang="en-US"/>
           </a:p>
@@ -2869,7 +2869,7 @@
           <a:p>
             <a:fld id="{883CD2A6-7895-48F9-BCB3-1493861FCC05}" type="datetimeFigureOut">
               <a:rPr lang="en-US" smtClean="0"/>
-              <a:t>1/17/2017</a:t>
+              <a:t>10/12/2016</a:t>
             </a:fld>
             <a:endParaRPr lang="en-US"/>
           </a:p>
@@ -3039,7 +3039,7 @@
           <a:p>
             <a:fld id="{883CD2A6-7895-48F9-BCB3-1493861FCC05}" type="datetimeFigureOut">
               <a:rPr lang="en-US" smtClean="0"/>
-              <a:t>1/17/2017</a:t>
+              <a:t>10/12/2016</a:t>
             </a:fld>
             <a:endParaRPr lang="en-US"/>
           </a:p>
@@ -3219,7 +3219,7 @@
           <a:p>
             <a:fld id="{883CD2A6-7895-48F9-BCB3-1493861FCC05}" type="datetimeFigureOut">
               <a:rPr lang="en-US" smtClean="0"/>
-              <a:t>1/17/2017</a:t>
+              <a:t>10/12/2016</a:t>
             </a:fld>
             <a:endParaRPr lang="en-US"/>
           </a:p>
@@ -3389,7 +3389,7 @@
           <a:p>
             <a:fld id="{883CD2A6-7895-48F9-BCB3-1493861FCC05}" type="datetimeFigureOut">
               <a:rPr lang="en-US" smtClean="0"/>
-              <a:t>1/17/2017</a:t>
+              <a:t>10/12/2016</a:t>
             </a:fld>
             <a:endParaRPr lang="en-US"/>
           </a:p>
@@ -3636,7 +3636,7 @@
           <a:p>
             <a:fld id="{883CD2A6-7895-48F9-BCB3-1493861FCC05}" type="datetimeFigureOut">
               <a:rPr lang="en-US" smtClean="0"/>
-              <a:t>1/17/2017</a:t>
+              <a:t>10/12/2016</a:t>
             </a:fld>
             <a:endParaRPr lang="en-US"/>
           </a:p>
@@ -3928,7 +3928,7 @@
           <a:p>
             <a:fld id="{883CD2A6-7895-48F9-BCB3-1493861FCC05}" type="datetimeFigureOut">
               <a:rPr lang="en-US" smtClean="0"/>
-              <a:t>1/17/2017</a:t>
+              <a:t>10/12/2016</a:t>
             </a:fld>
             <a:endParaRPr lang="en-US"/>
           </a:p>
@@ -4372,7 +4372,7 @@
           <a:p>
             <a:fld id="{883CD2A6-7895-48F9-BCB3-1493861FCC05}" type="datetimeFigureOut">
               <a:rPr lang="en-US" smtClean="0"/>
-              <a:t>1/17/2017</a:t>
+              <a:t>10/12/2016</a:t>
             </a:fld>
             <a:endParaRPr lang="en-US"/>
           </a:p>
@@ -4490,7 +4490,7 @@
           <a:p>
             <a:fld id="{883CD2A6-7895-48F9-BCB3-1493861FCC05}" type="datetimeFigureOut">
               <a:rPr lang="en-US" smtClean="0"/>
-              <a:t>1/17/2017</a:t>
+              <a:t>10/12/2016</a:t>
             </a:fld>
             <a:endParaRPr lang="en-US"/>
           </a:p>
@@ -4585,7 +4585,7 @@
           <a:p>
             <a:fld id="{883CD2A6-7895-48F9-BCB3-1493861FCC05}" type="datetimeFigureOut">
               <a:rPr lang="en-US" smtClean="0"/>
-              <a:t>1/17/2017</a:t>
+              <a:t>10/12/2016</a:t>
             </a:fld>
             <a:endParaRPr lang="en-US"/>
           </a:p>
@@ -4864,7 +4864,7 @@
           <a:p>
             <a:fld id="{883CD2A6-7895-48F9-BCB3-1493861FCC05}" type="datetimeFigureOut">
               <a:rPr lang="en-US" smtClean="0"/>
-              <a:t>1/17/2017</a:t>
+              <a:t>10/12/2016</a:t>
             </a:fld>
             <a:endParaRPr lang="en-US"/>
           </a:p>
@@ -5139,7 +5139,7 @@
           <a:p>
             <a:fld id="{883CD2A6-7895-48F9-BCB3-1493861FCC05}" type="datetimeFigureOut">
               <a:rPr lang="en-US" smtClean="0"/>
-              <a:t>1/17/2017</a:t>
+              <a:t>10/12/2016</a:t>
             </a:fld>
             <a:endParaRPr lang="en-US"/>
           </a:p>
@@ -5568,7 +5568,7 @@
           <a:p>
             <a:fld id="{883CD2A6-7895-48F9-BCB3-1493861FCC05}" type="datetimeFigureOut">
               <a:rPr lang="en-US" smtClean="0"/>
-              <a:t>1/17/2017</a:t>
+              <a:t>10/12/2016</a:t>
             </a:fld>
             <a:endParaRPr lang="en-US"/>
           </a:p>
@@ -6430,7 +6430,7 @@
           <a:p>
             <a:r>
               <a:rPr lang="en-US" dirty="0"/>
-              <a:t>Many machine learning algorithms will take a similar approach:</a:t>
+              <a:t>Many machine Learning Algorithms will take a similar approach:</a:t>
             </a:r>
           </a:p>
           <a:p>
@@ -6607,14 +6607,7 @@
             <a:pPr lvl="1"/>
             <a:r>
               <a:rPr lang="en-US" dirty="0"/>
-              <a:t>Feature – [size of house, number of rooms, location] &lt;- One feature</a:t>
-            </a:r>
-          </a:p>
-          <a:p>
-            <a:pPr lvl="1"/>
-            <a:r>
-              <a:rPr lang="en-US" dirty="0"/>
-              <a:t>Features – A collection of multiple instances of the data feature</a:t>
+              <a:t>Features – size of house, number of rooms, location</a:t>
             </a:r>
           </a:p>
           <a:p>

</xml_diff>